<commit_message>
docs: update ppt files
</commit_message>
<xml_diff>
--- a/架构设计-ArchitectureDesign/ArchitectureDesign.pptx
+++ b/架构设计-ArchitectureDesign/ArchitectureDesign.pptx
@@ -12399,12 +12399,12 @@
             <a:endParaRPr lang="en-US" sz="1215" dirty="0"/>
           </a:p>
           <a:p>
-            <a:pPr marL="342900" indent="-342900" algn="l">
+            <a:pPr indent="0" algn="l">
               <a:lnSpc>
                 <a:spcPct val="150000"/>
               </a:lnSpc>
               <a:buSzPct val="100000"/>
-              <a:buChar char="•"/>
+              <a:buNone/>
             </a:pPr>
             <a:r>
               <a:rPr lang="en-US" sz="1215" dirty="0">

</xml_diff>